<commit_message>
Fixed typo in slides.
</commit_message>
<xml_diff>
--- a/Slides.pptx
+++ b/Slides.pptx
@@ -271,7 +271,7 @@
           <a:p>
             <a:fld id="{F586530B-980B-4ECA-AC9F-6D25A2D22B0A}" type="datetimeFigureOut">
               <a:rPr lang="it-IT" smtClean="0"/>
-              <a:t>05/03/2024</a:t>
+              <a:t>06/03/2024</a:t>
             </a:fld>
             <a:endParaRPr lang="it-IT"/>
           </a:p>
@@ -469,7 +469,7 @@
           <a:p>
             <a:fld id="{F586530B-980B-4ECA-AC9F-6D25A2D22B0A}" type="datetimeFigureOut">
               <a:rPr lang="it-IT" smtClean="0"/>
-              <a:t>05/03/2024</a:t>
+              <a:t>06/03/2024</a:t>
             </a:fld>
             <a:endParaRPr lang="it-IT"/>
           </a:p>
@@ -677,7 +677,7 @@
           <a:p>
             <a:fld id="{F586530B-980B-4ECA-AC9F-6D25A2D22B0A}" type="datetimeFigureOut">
               <a:rPr lang="it-IT" smtClean="0"/>
-              <a:t>05/03/2024</a:t>
+              <a:t>06/03/2024</a:t>
             </a:fld>
             <a:endParaRPr lang="it-IT"/>
           </a:p>
@@ -875,7 +875,7 @@
           <a:p>
             <a:fld id="{F586530B-980B-4ECA-AC9F-6D25A2D22B0A}" type="datetimeFigureOut">
               <a:rPr lang="it-IT" smtClean="0"/>
-              <a:t>05/03/2024</a:t>
+              <a:t>06/03/2024</a:t>
             </a:fld>
             <a:endParaRPr lang="it-IT"/>
           </a:p>
@@ -1150,7 +1150,7 @@
           <a:p>
             <a:fld id="{F586530B-980B-4ECA-AC9F-6D25A2D22B0A}" type="datetimeFigureOut">
               <a:rPr lang="it-IT" smtClean="0"/>
-              <a:t>05/03/2024</a:t>
+              <a:t>06/03/2024</a:t>
             </a:fld>
             <a:endParaRPr lang="it-IT"/>
           </a:p>
@@ -1415,7 +1415,7 @@
           <a:p>
             <a:fld id="{F586530B-980B-4ECA-AC9F-6D25A2D22B0A}" type="datetimeFigureOut">
               <a:rPr lang="it-IT" smtClean="0"/>
-              <a:t>05/03/2024</a:t>
+              <a:t>06/03/2024</a:t>
             </a:fld>
             <a:endParaRPr lang="it-IT"/>
           </a:p>
@@ -1827,7 +1827,7 @@
           <a:p>
             <a:fld id="{F586530B-980B-4ECA-AC9F-6D25A2D22B0A}" type="datetimeFigureOut">
               <a:rPr lang="it-IT" smtClean="0"/>
-              <a:t>05/03/2024</a:t>
+              <a:t>06/03/2024</a:t>
             </a:fld>
             <a:endParaRPr lang="it-IT"/>
           </a:p>
@@ -1968,7 +1968,7 @@
           <a:p>
             <a:fld id="{F586530B-980B-4ECA-AC9F-6D25A2D22B0A}" type="datetimeFigureOut">
               <a:rPr lang="it-IT" smtClean="0"/>
-              <a:t>05/03/2024</a:t>
+              <a:t>06/03/2024</a:t>
             </a:fld>
             <a:endParaRPr lang="it-IT"/>
           </a:p>
@@ -2081,7 +2081,7 @@
           <a:p>
             <a:fld id="{F586530B-980B-4ECA-AC9F-6D25A2D22B0A}" type="datetimeFigureOut">
               <a:rPr lang="it-IT" smtClean="0"/>
-              <a:t>05/03/2024</a:t>
+              <a:t>06/03/2024</a:t>
             </a:fld>
             <a:endParaRPr lang="it-IT"/>
           </a:p>
@@ -2392,7 +2392,7 @@
           <a:p>
             <a:fld id="{F586530B-980B-4ECA-AC9F-6D25A2D22B0A}" type="datetimeFigureOut">
               <a:rPr lang="it-IT" smtClean="0"/>
-              <a:t>05/03/2024</a:t>
+              <a:t>06/03/2024</a:t>
             </a:fld>
             <a:endParaRPr lang="it-IT"/>
           </a:p>
@@ -2680,7 +2680,7 @@
           <a:p>
             <a:fld id="{F586530B-980B-4ECA-AC9F-6D25A2D22B0A}" type="datetimeFigureOut">
               <a:rPr lang="it-IT" smtClean="0"/>
-              <a:t>05/03/2024</a:t>
+              <a:t>06/03/2024</a:t>
             </a:fld>
             <a:endParaRPr lang="it-IT"/>
           </a:p>
@@ -2945,7 +2945,7 @@
           <a:p>
             <a:fld id="{F586530B-980B-4ECA-AC9F-6D25A2D22B0A}" type="datetimeFigureOut">
               <a:rPr lang="it-IT" smtClean="0"/>
-              <a:t>05/03/2024</a:t>
+              <a:t>06/03/2024</a:t>
             </a:fld>
             <a:endParaRPr lang="it-IT"/>
           </a:p>
@@ -5061,21 +5061,21 @@
                 <a:latin typeface="Calibri" panose="020F0502020204030204" pitchFamily="34" charset="0"/>
                 <a:cs typeface="Calibri" panose="020F0502020204030204" pitchFamily="34" charset="0"/>
               </a:rPr>
-              <a:t> scale </a:t>
+              <a:t> scale with </a:t>
             </a:r>
             <a:r>
               <a:rPr lang="it-IT" sz="2400" dirty="0" err="1">
                 <a:latin typeface="Calibri" panose="020F0502020204030204" pitchFamily="34" charset="0"/>
                 <a:cs typeface="Calibri" panose="020F0502020204030204" pitchFamily="34" charset="0"/>
               </a:rPr>
-              <a:t>linearly</a:t>
-            </a:r>
-            <a:r>
-              <a:rPr lang="it-IT" sz="2400" dirty="0">
-                <a:latin typeface="Calibri" panose="020F0502020204030204" pitchFamily="34" charset="0"/>
-                <a:cs typeface="Calibri" panose="020F0502020204030204" pitchFamily="34" charset="0"/>
-              </a:rPr>
-              <a:t> with the </a:t>
+              <a:t>respect</a:t>
+            </a:r>
+            <a:r>
+              <a:rPr lang="it-IT" sz="2400">
+                <a:latin typeface="Calibri" panose="020F0502020204030204" pitchFamily="34" charset="0"/>
+                <a:cs typeface="Calibri" panose="020F0502020204030204" pitchFamily="34" charset="0"/>
+              </a:rPr>
+              <a:t> to the </a:t>
             </a:r>
             <a:r>
               <a:rPr lang="it-IT" sz="2400" dirty="0" err="1">

</xml_diff>